<commit_message>
running water restictrion firsts and lasts through all analysis including jerk ratios
</commit_message>
<xml_diff>
--- a/presentations/231215_3.pptx
+++ b/presentations/231215_3.pptx
@@ -263,7 +263,7 @@
           <a:p>
             <a:fld id="{DB3D4718-F915-004B-9F09-68AAF001912E}" type="datetimeFigureOut">
               <a:rPr lang="en-US" smtClean="0"/>
-              <a:t>12/15/23</a:t>
+              <a:t>12/16/23</a:t>
             </a:fld>
             <a:endParaRPr lang="en-US"/>
           </a:p>
@@ -461,7 +461,7 @@
           <a:p>
             <a:fld id="{DB3D4718-F915-004B-9F09-68AAF001912E}" type="datetimeFigureOut">
               <a:rPr lang="en-US" smtClean="0"/>
-              <a:t>12/15/23</a:t>
+              <a:t>12/16/23</a:t>
             </a:fld>
             <a:endParaRPr lang="en-US"/>
           </a:p>
@@ -669,7 +669,7 @@
           <a:p>
             <a:fld id="{DB3D4718-F915-004B-9F09-68AAF001912E}" type="datetimeFigureOut">
               <a:rPr lang="en-US" smtClean="0"/>
-              <a:t>12/15/23</a:t>
+              <a:t>12/16/23</a:t>
             </a:fld>
             <a:endParaRPr lang="en-US"/>
           </a:p>
@@ -867,7 +867,7 @@
           <a:p>
             <a:fld id="{DB3D4718-F915-004B-9F09-68AAF001912E}" type="datetimeFigureOut">
               <a:rPr lang="en-US" smtClean="0"/>
-              <a:t>12/15/23</a:t>
+              <a:t>12/16/23</a:t>
             </a:fld>
             <a:endParaRPr lang="en-US"/>
           </a:p>
@@ -1142,7 +1142,7 @@
           <a:p>
             <a:fld id="{DB3D4718-F915-004B-9F09-68AAF001912E}" type="datetimeFigureOut">
               <a:rPr lang="en-US" smtClean="0"/>
-              <a:t>12/15/23</a:t>
+              <a:t>12/16/23</a:t>
             </a:fld>
             <a:endParaRPr lang="en-US"/>
           </a:p>
@@ -1407,7 +1407,7 @@
           <a:p>
             <a:fld id="{DB3D4718-F915-004B-9F09-68AAF001912E}" type="datetimeFigureOut">
               <a:rPr lang="en-US" smtClean="0"/>
-              <a:t>12/15/23</a:t>
+              <a:t>12/16/23</a:t>
             </a:fld>
             <a:endParaRPr lang="en-US"/>
           </a:p>
@@ -1819,7 +1819,7 @@
           <a:p>
             <a:fld id="{DB3D4718-F915-004B-9F09-68AAF001912E}" type="datetimeFigureOut">
               <a:rPr lang="en-US" smtClean="0"/>
-              <a:t>12/15/23</a:t>
+              <a:t>12/16/23</a:t>
             </a:fld>
             <a:endParaRPr lang="en-US"/>
           </a:p>
@@ -1960,7 +1960,7 @@
           <a:p>
             <a:fld id="{DB3D4718-F915-004B-9F09-68AAF001912E}" type="datetimeFigureOut">
               <a:rPr lang="en-US" smtClean="0"/>
-              <a:t>12/15/23</a:t>
+              <a:t>12/16/23</a:t>
             </a:fld>
             <a:endParaRPr lang="en-US"/>
           </a:p>
@@ -2073,7 +2073,7 @@
           <a:p>
             <a:fld id="{DB3D4718-F915-004B-9F09-68AAF001912E}" type="datetimeFigureOut">
               <a:rPr lang="en-US" smtClean="0"/>
-              <a:t>12/15/23</a:t>
+              <a:t>12/16/23</a:t>
             </a:fld>
             <a:endParaRPr lang="en-US"/>
           </a:p>
@@ -2384,7 +2384,7 @@
           <a:p>
             <a:fld id="{DB3D4718-F915-004B-9F09-68AAF001912E}" type="datetimeFigureOut">
               <a:rPr lang="en-US" smtClean="0"/>
-              <a:t>12/15/23</a:t>
+              <a:t>12/16/23</a:t>
             </a:fld>
             <a:endParaRPr lang="en-US"/>
           </a:p>
@@ -2672,7 +2672,7 @@
           <a:p>
             <a:fld id="{DB3D4718-F915-004B-9F09-68AAF001912E}" type="datetimeFigureOut">
               <a:rPr lang="en-US" smtClean="0"/>
-              <a:t>12/15/23</a:t>
+              <a:t>12/16/23</a:t>
             </a:fld>
             <a:endParaRPr lang="en-US"/>
           </a:p>
@@ -2913,7 +2913,7 @@
           <a:p>
             <a:fld id="{DB3D4718-F915-004B-9F09-68AAF001912E}" type="datetimeFigureOut">
               <a:rPr lang="en-US" smtClean="0"/>
-              <a:t>12/15/23</a:t>
+              <a:t>12/16/23</a:t>
             </a:fld>
             <a:endParaRPr lang="en-US"/>
           </a:p>
@@ -3550,6 +3550,96 @@
           </a:prstGeom>
         </p:spPr>
       </p:pic>
+      <p:pic>
+        <p:nvPicPr>
+          <p:cNvPr id="5" name="Picture 4">
+            <a:extLst>
+              <a:ext uri="{FF2B5EF4-FFF2-40B4-BE49-F238E27FC236}">
+                <a16:creationId xmlns:a16="http://schemas.microsoft.com/office/drawing/2014/main" id="{E2AFD02F-6BE5-59DB-46A8-3E113044275E}"/>
+              </a:ext>
+            </a:extLst>
+          </p:cNvPr>
+          <p:cNvPicPr>
+            <a:picLocks noChangeAspect="1"/>
+          </p:cNvPicPr>
+          <p:nvPr/>
+        </p:nvPicPr>
+        <p:blipFill>
+          <a:blip r:embed="rId5"/>
+          <a:stretch>
+            <a:fillRect/>
+          </a:stretch>
+        </p:blipFill>
+        <p:spPr>
+          <a:xfrm>
+            <a:off x="8441369" y="131051"/>
+            <a:ext cx="2580599" cy="2049299"/>
+          </a:xfrm>
+          <a:prstGeom prst="rect">
+            <a:avLst/>
+          </a:prstGeom>
+        </p:spPr>
+      </p:pic>
+      <p:pic>
+        <p:nvPicPr>
+          <p:cNvPr id="6" name="Picture 5">
+            <a:extLst>
+              <a:ext uri="{FF2B5EF4-FFF2-40B4-BE49-F238E27FC236}">
+                <a16:creationId xmlns:a16="http://schemas.microsoft.com/office/drawing/2014/main" id="{08C433F7-03A9-646D-46C8-1E741DD9FF0B}"/>
+              </a:ext>
+            </a:extLst>
+          </p:cNvPr>
+          <p:cNvPicPr>
+            <a:picLocks noChangeAspect="1"/>
+          </p:cNvPicPr>
+          <p:nvPr/>
+        </p:nvPicPr>
+        <p:blipFill>
+          <a:blip r:embed="rId6"/>
+          <a:stretch>
+            <a:fillRect/>
+          </a:stretch>
+        </p:blipFill>
+        <p:spPr>
+          <a:xfrm>
+            <a:off x="8441369" y="2359703"/>
+            <a:ext cx="2580599" cy="2049299"/>
+          </a:xfrm>
+          <a:prstGeom prst="rect">
+            <a:avLst/>
+          </a:prstGeom>
+        </p:spPr>
+      </p:pic>
+      <p:pic>
+        <p:nvPicPr>
+          <p:cNvPr id="7" name="Picture 6">
+            <a:extLst>
+              <a:ext uri="{FF2B5EF4-FFF2-40B4-BE49-F238E27FC236}">
+                <a16:creationId xmlns:a16="http://schemas.microsoft.com/office/drawing/2014/main" id="{3B840B68-7CF6-9893-53E6-8632325E342C}"/>
+              </a:ext>
+            </a:extLst>
+          </p:cNvPr>
+          <p:cNvPicPr>
+            <a:picLocks noChangeAspect="1"/>
+          </p:cNvPicPr>
+          <p:nvPr/>
+        </p:nvPicPr>
+        <p:blipFill>
+          <a:blip r:embed="rId7"/>
+          <a:stretch>
+            <a:fillRect/>
+          </a:stretch>
+        </p:blipFill>
+        <p:spPr>
+          <a:xfrm>
+            <a:off x="8647034" y="4580650"/>
+            <a:ext cx="2580599" cy="2049299"/>
+          </a:xfrm>
+          <a:prstGeom prst="rect">
+            <a:avLst/>
+          </a:prstGeom>
+        </p:spPr>
+      </p:pic>
     </p:spTree>
     <p:extLst>
       <p:ext uri="{BB962C8B-B14F-4D97-AF65-F5344CB8AC3E}">
@@ -3699,6 +3789,96 @@
           <a:xfrm>
             <a:off x="843708" y="2531351"/>
             <a:ext cx="6581657" cy="2128574"/>
+          </a:xfrm>
+          <a:prstGeom prst="rect">
+            <a:avLst/>
+          </a:prstGeom>
+        </p:spPr>
+      </p:pic>
+      <p:pic>
+        <p:nvPicPr>
+          <p:cNvPr id="4" name="Picture 3">
+            <a:extLst>
+              <a:ext uri="{FF2B5EF4-FFF2-40B4-BE49-F238E27FC236}">
+                <a16:creationId xmlns:a16="http://schemas.microsoft.com/office/drawing/2014/main" id="{403E586F-12FB-DA02-7B10-6F5DC7CC1E39}"/>
+              </a:ext>
+            </a:extLst>
+          </p:cNvPr>
+          <p:cNvPicPr>
+            <a:picLocks noChangeAspect="1"/>
+          </p:cNvPicPr>
+          <p:nvPr/>
+        </p:nvPicPr>
+        <p:blipFill>
+          <a:blip r:embed="rId5"/>
+          <a:stretch>
+            <a:fillRect/>
+          </a:stretch>
+        </p:blipFill>
+        <p:spPr>
+          <a:xfrm>
+            <a:off x="8356985" y="181754"/>
+            <a:ext cx="2759263" cy="2128574"/>
+          </a:xfrm>
+          <a:prstGeom prst="rect">
+            <a:avLst/>
+          </a:prstGeom>
+        </p:spPr>
+      </p:pic>
+      <p:pic>
+        <p:nvPicPr>
+          <p:cNvPr id="5" name="Picture 4">
+            <a:extLst>
+              <a:ext uri="{FF2B5EF4-FFF2-40B4-BE49-F238E27FC236}">
+                <a16:creationId xmlns:a16="http://schemas.microsoft.com/office/drawing/2014/main" id="{3678D729-307B-4F59-4872-C9518D97FBAE}"/>
+              </a:ext>
+            </a:extLst>
+          </p:cNvPr>
+          <p:cNvPicPr>
+            <a:picLocks noChangeAspect="1"/>
+          </p:cNvPicPr>
+          <p:nvPr/>
+        </p:nvPicPr>
+        <p:blipFill>
+          <a:blip r:embed="rId6"/>
+          <a:stretch>
+            <a:fillRect/>
+          </a:stretch>
+        </p:blipFill>
+        <p:spPr>
+          <a:xfrm>
+            <a:off x="8435821" y="2310328"/>
+            <a:ext cx="2680427" cy="2128574"/>
+          </a:xfrm>
+          <a:prstGeom prst="rect">
+            <a:avLst/>
+          </a:prstGeom>
+        </p:spPr>
+      </p:pic>
+      <p:pic>
+        <p:nvPicPr>
+          <p:cNvPr id="6" name="Picture 5">
+            <a:extLst>
+              <a:ext uri="{FF2B5EF4-FFF2-40B4-BE49-F238E27FC236}">
+                <a16:creationId xmlns:a16="http://schemas.microsoft.com/office/drawing/2014/main" id="{74AD0670-AD73-0AF4-E07A-0835C37066AD}"/>
+              </a:ext>
+            </a:extLst>
+          </p:cNvPr>
+          <p:cNvPicPr>
+            <a:picLocks noChangeAspect="1"/>
+          </p:cNvPicPr>
+          <p:nvPr/>
+        </p:nvPicPr>
+        <p:blipFill>
+          <a:blip r:embed="rId7"/>
+          <a:stretch>
+            <a:fillRect/>
+          </a:stretch>
+        </p:blipFill>
+        <p:spPr>
+          <a:xfrm>
+            <a:off x="8325691" y="4547673"/>
+            <a:ext cx="3022600" cy="2400300"/>
           </a:xfrm>
           <a:prstGeom prst="rect">
             <a:avLst/>
@@ -3860,6 +4040,115 @@
           </a:prstGeom>
         </p:spPr>
       </p:pic>
+      <p:pic>
+        <p:nvPicPr>
+          <p:cNvPr id="3" name="Picture 2">
+            <a:extLst>
+              <a:ext uri="{FF2B5EF4-FFF2-40B4-BE49-F238E27FC236}">
+                <a16:creationId xmlns:a16="http://schemas.microsoft.com/office/drawing/2014/main" id="{3CF830C2-5CA1-D058-4609-3501EBAEF562}"/>
+              </a:ext>
+            </a:extLst>
+          </p:cNvPr>
+          <p:cNvPicPr>
+            <a:picLocks noChangeAspect="1"/>
+          </p:cNvPicPr>
+          <p:nvPr/>
+        </p:nvPicPr>
+        <p:blipFill>
+          <a:blip r:embed="rId5"/>
+          <a:stretch>
+            <a:fillRect/>
+          </a:stretch>
+        </p:blipFill>
+        <p:spPr>
+          <a:xfrm>
+            <a:off x="8221033" y="131051"/>
+            <a:ext cx="3022600" cy="2400300"/>
+          </a:xfrm>
+          <a:prstGeom prst="rect">
+            <a:avLst/>
+          </a:prstGeom>
+        </p:spPr>
+      </p:pic>
+      <p:pic>
+        <p:nvPicPr>
+          <p:cNvPr id="4" name="Picture 3">
+            <a:extLst>
+              <a:ext uri="{FF2B5EF4-FFF2-40B4-BE49-F238E27FC236}">
+                <a16:creationId xmlns:a16="http://schemas.microsoft.com/office/drawing/2014/main" id="{728DCB34-AB77-280E-4E5F-544D1A8B0FA9}"/>
+              </a:ext>
+            </a:extLst>
+          </p:cNvPr>
+          <p:cNvPicPr>
+            <a:picLocks noChangeAspect="1"/>
+          </p:cNvPicPr>
+          <p:nvPr/>
+        </p:nvPicPr>
+        <p:blipFill>
+          <a:blip r:embed="rId6"/>
+          <a:stretch>
+            <a:fillRect/>
+          </a:stretch>
+        </p:blipFill>
+        <p:spPr>
+          <a:xfrm>
+            <a:off x="8119433" y="2736850"/>
+            <a:ext cx="3225800" cy="1384300"/>
+          </a:xfrm>
+          <a:prstGeom prst="rect">
+            <a:avLst/>
+          </a:prstGeom>
+        </p:spPr>
+      </p:pic>
+      <p:sp>
+        <p:nvSpPr>
+          <p:cNvPr id="5" name="TextBox 4">
+            <a:extLst>
+              <a:ext uri="{FF2B5EF4-FFF2-40B4-BE49-F238E27FC236}">
+                <a16:creationId xmlns:a16="http://schemas.microsoft.com/office/drawing/2014/main" id="{E9630884-F53B-BD54-64E9-20FFEECDA3D2}"/>
+              </a:ext>
+            </a:extLst>
+          </p:cNvPr>
+          <p:cNvSpPr txBox="1"/>
+          <p:nvPr/>
+        </p:nvSpPr>
+        <p:spPr>
+          <a:xfrm>
+            <a:off x="8908653" y="4133008"/>
+            <a:ext cx="3213893" cy="369332"/>
+          </a:xfrm>
+          <a:prstGeom prst="rect">
+            <a:avLst/>
+          </a:prstGeom>
+          <a:noFill/>
+        </p:spPr>
+        <p:txBody>
+          <a:bodyPr wrap="none" rtlCol="0">
+            <a:spAutoFit/>
+          </a:bodyPr>
+          <a:lstStyle/>
+          <a:p>
+            <a:r>
+              <a:rPr lang="en-US" dirty="0"/>
+              <a:t>(Mean jerk ratio says </a:t>
+            </a:r>
+            <a:r>
+              <a:rPr lang="en-US" b="0" i="0" dirty="0">
+                <a:solidFill>
+                  <a:srgbClr val="333333"/>
+                </a:solidFill>
+                <a:effectLst/>
+                <a:latin typeface="Menlo" panose="020B0609030804020204" pitchFamily="49" charset="0"/>
+              </a:rPr>
+              <a:t>4.2899</a:t>
+            </a:r>
+            <a:r>
+              <a:rPr lang="en-US" dirty="0"/>
+              <a:t>)</a:t>
+            </a:r>
+          </a:p>
+        </p:txBody>
+      </p:sp>
     </p:spTree>
     <p:extLst>
       <p:ext uri="{BB962C8B-B14F-4D97-AF65-F5344CB8AC3E}">

</xml_diff>

<commit_message>
done running through jerk ratios
</commit_message>
<xml_diff>
--- a/presentations/231215_3.pptx
+++ b/presentations/231215_3.pptx
@@ -4072,10 +4072,10 @@
       </p:pic>
       <p:pic>
         <p:nvPicPr>
-          <p:cNvPr id="4" name="Picture 3">
-            <a:extLst>
-              <a:ext uri="{FF2B5EF4-FFF2-40B4-BE49-F238E27FC236}">
-                <a16:creationId xmlns:a16="http://schemas.microsoft.com/office/drawing/2014/main" id="{728DCB34-AB77-280E-4E5F-544D1A8B0FA9}"/>
+          <p:cNvPr id="6" name="Picture 5">
+            <a:extLst>
+              <a:ext uri="{FF2B5EF4-FFF2-40B4-BE49-F238E27FC236}">
+                <a16:creationId xmlns:a16="http://schemas.microsoft.com/office/drawing/2014/main" id="{2A5BCE0F-BBF7-3369-3F00-908363830F95}"/>
               </a:ext>
             </a:extLst>
           </p:cNvPr>
@@ -4092,20 +4092,50 @@
         </p:blipFill>
         <p:spPr>
           <a:xfrm>
-            <a:off x="8119433" y="2736850"/>
-            <a:ext cx="3225800" cy="1384300"/>
+            <a:off x="8259133" y="4483888"/>
+            <a:ext cx="2946400" cy="2400300"/>
           </a:xfrm>
           <a:prstGeom prst="rect">
             <a:avLst/>
           </a:prstGeom>
         </p:spPr>
       </p:pic>
-      <p:sp>
-        <p:nvSpPr>
-          <p:cNvPr id="5" name="TextBox 4">
-            <a:extLst>
-              <a:ext uri="{FF2B5EF4-FFF2-40B4-BE49-F238E27FC236}">
-                <a16:creationId xmlns:a16="http://schemas.microsoft.com/office/drawing/2014/main" id="{E9630884-F53B-BD54-64E9-20FFEECDA3D2}"/>
+      <p:pic>
+        <p:nvPicPr>
+          <p:cNvPr id="7" name="Picture 6">
+            <a:extLst>
+              <a:ext uri="{FF2B5EF4-FFF2-40B4-BE49-F238E27FC236}">
+                <a16:creationId xmlns:a16="http://schemas.microsoft.com/office/drawing/2014/main" id="{957911D8-399C-C45E-64F3-C5659392557B}"/>
+              </a:ext>
+            </a:extLst>
+          </p:cNvPr>
+          <p:cNvPicPr>
+            <a:picLocks noChangeAspect="1"/>
+          </p:cNvPicPr>
+          <p:nvPr/>
+        </p:nvPicPr>
+        <p:blipFill>
+          <a:blip r:embed="rId7"/>
+          <a:stretch>
+            <a:fillRect/>
+          </a:stretch>
+        </p:blipFill>
+        <p:spPr>
+          <a:xfrm>
+            <a:off x="8317447" y="2659759"/>
+            <a:ext cx="2379931" cy="1835947"/>
+          </a:xfrm>
+          <a:prstGeom prst="rect">
+            <a:avLst/>
+          </a:prstGeom>
+        </p:spPr>
+      </p:pic>
+      <p:sp>
+        <p:nvSpPr>
+          <p:cNvPr id="12" name="TextBox 11">
+            <a:extLst>
+              <a:ext uri="{FF2B5EF4-FFF2-40B4-BE49-F238E27FC236}">
+                <a16:creationId xmlns:a16="http://schemas.microsoft.com/office/drawing/2014/main" id="{E698F94D-E47E-DDD9-6F4E-E895C7052A59}"/>
               </a:ext>
             </a:extLst>
           </p:cNvPr>
@@ -4114,8 +4144,8 @@
         </p:nvSpPr>
         <p:spPr>
           <a:xfrm>
-            <a:off x="8908653" y="4133008"/>
-            <a:ext cx="3213893" cy="369332"/>
+            <a:off x="10515600" y="2754217"/>
+            <a:ext cx="1676400" cy="1200329"/>
           </a:xfrm>
           <a:prstGeom prst="rect">
             <a:avLst/>
@@ -4123,28 +4153,30 @@
           <a:noFill/>
         </p:spPr>
         <p:txBody>
-          <a:bodyPr wrap="none" rtlCol="0">
+          <a:bodyPr wrap="square" rtlCol="0">
             <a:spAutoFit/>
           </a:bodyPr>
           <a:lstStyle/>
           <a:p>
             <a:r>
-              <a:rPr lang="en-US" dirty="0"/>
-              <a:t>(Mean jerk ratio says </a:t>
-            </a:r>
-            <a:r>
-              <a:rPr lang="en-US" b="0" i="0" dirty="0">
-                <a:solidFill>
-                  <a:srgbClr val="333333"/>
-                </a:solidFill>
-                <a:effectLst/>
-                <a:latin typeface="Menlo" panose="020B0609030804020204" pitchFamily="49" charset="0"/>
-              </a:rPr>
-              <a:t>4.2899</a:t>
-            </a:r>
-            <a:r>
-              <a:rPr lang="en-US" dirty="0"/>
-              <a:t>)</a:t>
+              <a:rPr lang="en-US" sz="1200" dirty="0"/>
+              <a:t>Only doing first </a:t>
+            </a:r>
+            <a:r>
+              <a:rPr lang="en-US" sz="1200" dirty="0" err="1"/>
+              <a:t>matfiles</a:t>
+            </a:r>
+            <a:r>
+              <a:rPr lang="en-US" sz="1200" dirty="0"/>
+              <a:t> for now (haven’t gone through combining them in </a:t>
+            </a:r>
+            <a:r>
+              <a:rPr lang="en-US" sz="1200" dirty="0" err="1"/>
+              <a:t>Matlab</a:t>
+            </a:r>
+            <a:r>
+              <a:rPr lang="en-US" sz="1200" dirty="0"/>
+              <a:t>), so some have less than 100 trials</a:t>
             </a:r>
           </a:p>
         </p:txBody>
@@ -4298,6 +4330,96 @@
           <a:xfrm>
             <a:off x="843709" y="2531351"/>
             <a:ext cx="6581654" cy="2128573"/>
+          </a:xfrm>
+          <a:prstGeom prst="rect">
+            <a:avLst/>
+          </a:prstGeom>
+        </p:spPr>
+      </p:pic>
+      <p:pic>
+        <p:nvPicPr>
+          <p:cNvPr id="3" name="Picture 2">
+            <a:extLst>
+              <a:ext uri="{FF2B5EF4-FFF2-40B4-BE49-F238E27FC236}">
+                <a16:creationId xmlns:a16="http://schemas.microsoft.com/office/drawing/2014/main" id="{1577E2A5-C42A-D6A9-E7DF-A04DB926FFAB}"/>
+              </a:ext>
+            </a:extLst>
+          </p:cNvPr>
+          <p:cNvPicPr>
+            <a:picLocks noChangeAspect="1"/>
+          </p:cNvPicPr>
+          <p:nvPr/>
+        </p:nvPicPr>
+        <p:blipFill>
+          <a:blip r:embed="rId5"/>
+          <a:stretch>
+            <a:fillRect/>
+          </a:stretch>
+        </p:blipFill>
+        <p:spPr>
+          <a:xfrm>
+            <a:off x="8441366" y="171222"/>
+            <a:ext cx="2264075" cy="1797942"/>
+          </a:xfrm>
+          <a:prstGeom prst="rect">
+            <a:avLst/>
+          </a:prstGeom>
+        </p:spPr>
+      </p:pic>
+      <p:pic>
+        <p:nvPicPr>
+          <p:cNvPr id="4" name="Picture 3">
+            <a:extLst>
+              <a:ext uri="{FF2B5EF4-FFF2-40B4-BE49-F238E27FC236}">
+                <a16:creationId xmlns:a16="http://schemas.microsoft.com/office/drawing/2014/main" id="{2150213C-CA7B-FB50-591D-8B1BA63F0439}"/>
+              </a:ext>
+            </a:extLst>
+          </p:cNvPr>
+          <p:cNvPicPr>
+            <a:picLocks noChangeAspect="1"/>
+          </p:cNvPicPr>
+          <p:nvPr/>
+        </p:nvPicPr>
+        <p:blipFill>
+          <a:blip r:embed="rId6"/>
+          <a:stretch>
+            <a:fillRect/>
+          </a:stretch>
+        </p:blipFill>
+        <p:spPr>
+          <a:xfrm>
+            <a:off x="8496015" y="2530029"/>
+            <a:ext cx="2264075" cy="1797942"/>
+          </a:xfrm>
+          <a:prstGeom prst="rect">
+            <a:avLst/>
+          </a:prstGeom>
+        </p:spPr>
+      </p:pic>
+      <p:pic>
+        <p:nvPicPr>
+          <p:cNvPr id="5" name="Picture 4">
+            <a:extLst>
+              <a:ext uri="{FF2B5EF4-FFF2-40B4-BE49-F238E27FC236}">
+                <a16:creationId xmlns:a16="http://schemas.microsoft.com/office/drawing/2014/main" id="{DC39A736-121F-C0C2-FDFB-51853F84D6DD}"/>
+              </a:ext>
+            </a:extLst>
+          </p:cNvPr>
+          <p:cNvPicPr>
+            <a:picLocks noChangeAspect="1"/>
+          </p:cNvPicPr>
+          <p:nvPr/>
+        </p:nvPicPr>
+        <p:blipFill>
+          <a:blip r:embed="rId7"/>
+          <a:stretch>
+            <a:fillRect/>
+          </a:stretch>
+        </p:blipFill>
+        <p:spPr>
+          <a:xfrm>
+            <a:off x="8584365" y="4785067"/>
+            <a:ext cx="2264075" cy="1797942"/>
           </a:xfrm>
           <a:prstGeom prst="rect">
             <a:avLst/>

</xml_diff>